<commit_message>
Finish slide 20 and demo
</commit_message>
<xml_diff>
--- a/Qualite de code et PSCodeHealth.pptx
+++ b/Qualite de code et PSCodeHealth.pptx
@@ -22,6 +22,9 @@
     <p:sldId id="270" r:id="rId16"/>
     <p:sldId id="271" r:id="rId17"/>
     <p:sldId id="272" r:id="rId18"/>
+    <p:sldId id="273" r:id="rId19"/>
+    <p:sldId id="274" r:id="rId20"/>
+    <p:sldId id="275" r:id="rId21"/>
   </p:sldIdLst>
   <p:sldSz cx="9144000" cy="6858000" type="screen4x3"/>
   <p:notesSz cx="6858000" cy="9144000"/>
@@ -3795,7 +3798,7 @@
           <a:p>
             <a:fld id="{3CCDA83E-EA51-4128-A010-1A549244A730}" type="datetimeFigureOut">
               <a:rPr lang="en-US" smtClean="0"/>
-              <a:t>12/1/2017</a:t>
+              <a:t>12/3/2017</a:t>
             </a:fld>
             <a:endParaRPr lang="en-US"/>
           </a:p>
@@ -4007,7 +4010,7 @@
           <a:p>
             <a:fld id="{3CCDA83E-EA51-4128-A010-1A549244A730}" type="datetimeFigureOut">
               <a:rPr lang="en-US" smtClean="0"/>
-              <a:t>12/1/2017</a:t>
+              <a:t>12/3/2017</a:t>
             </a:fld>
             <a:endParaRPr lang="en-US"/>
           </a:p>
@@ -4194,7 +4197,7 @@
           <a:p>
             <a:fld id="{3CCDA83E-EA51-4128-A010-1A549244A730}" type="datetimeFigureOut">
               <a:rPr lang="en-US" smtClean="0"/>
-              <a:t>12/1/2017</a:t>
+              <a:t>12/3/2017</a:t>
             </a:fld>
             <a:endParaRPr lang="en-US"/>
           </a:p>
@@ -4291,7 +4294,7 @@
           <a:p>
             <a:fld id="{3CCDA83E-EA51-4128-A010-1A549244A730}" type="datetimeFigureOut">
               <a:rPr lang="en-US" smtClean="0"/>
-              <a:t>12/1/2017</a:t>
+              <a:t>12/3/2017</a:t>
             </a:fld>
             <a:endParaRPr lang="en-US"/>
           </a:p>
@@ -4887,7 +4890,7 @@
           <a:p>
             <a:fld id="{3CCDA83E-EA51-4128-A010-1A549244A730}" type="datetimeFigureOut">
               <a:rPr lang="en-US" smtClean="0"/>
-              <a:t>12/1/2017</a:t>
+              <a:t>12/3/2017</a:t>
             </a:fld>
             <a:endParaRPr lang="en-US"/>
           </a:p>
@@ -4984,7 +4987,7 @@
           <a:p>
             <a:fld id="{3CCDA83E-EA51-4128-A010-1A549244A730}" type="datetimeFigureOut">
               <a:rPr lang="en-US" smtClean="0"/>
-              <a:t>12/1/2017</a:t>
+              <a:t>12/3/2017</a:t>
             </a:fld>
             <a:endParaRPr lang="en-US"/>
           </a:p>
@@ -5589,7 +5592,7 @@
           <a:p>
             <a:fld id="{3CCDA83E-EA51-4128-A010-1A549244A730}" type="datetimeFigureOut">
               <a:rPr lang="en-US" smtClean="0"/>
-              <a:t>12/1/2017</a:t>
+              <a:t>12/3/2017</a:t>
             </a:fld>
             <a:endParaRPr lang="en-US"/>
           </a:p>
@@ -5732,7 +5735,7 @@
           <a:p>
             <a:fld id="{3CCDA83E-EA51-4128-A010-1A549244A730}" type="datetimeFigureOut">
               <a:rPr lang="en-US" smtClean="0"/>
-              <a:t>12/1/2017</a:t>
+              <a:t>12/3/2017</a:t>
             </a:fld>
             <a:endParaRPr lang="en-US"/>
           </a:p>
@@ -5829,7 +5832,7 @@
           <a:p>
             <a:fld id="{3CCDA83E-EA51-4128-A010-1A549244A730}" type="datetimeFigureOut">
               <a:rPr lang="en-US" smtClean="0"/>
-              <a:t>12/1/2017</a:t>
+              <a:t>12/3/2017</a:t>
             </a:fld>
             <a:endParaRPr lang="en-US"/>
           </a:p>
@@ -6113,7 +6116,7 @@
           <a:p>
             <a:fld id="{3CCDA83E-EA51-4128-A010-1A549244A730}" type="datetimeFigureOut">
               <a:rPr lang="en-US" smtClean="0"/>
-              <a:t>12/1/2017</a:t>
+              <a:t>12/3/2017</a:t>
             </a:fld>
             <a:endParaRPr lang="en-US"/>
           </a:p>
@@ -6635,7 +6638,7 @@
           <a:p>
             <a:fld id="{3CCDA83E-EA51-4128-A010-1A549244A730}" type="datetimeFigureOut">
               <a:rPr lang="en-US" smtClean="0"/>
-              <a:t>12/1/2017</a:t>
+              <a:t>12/3/2017</a:t>
             </a:fld>
             <a:endParaRPr lang="en-US"/>
           </a:p>
@@ -7176,7 +7179,7 @@
           <a:p>
             <a:fld id="{3CCDA83E-EA51-4128-A010-1A549244A730}" type="datetimeFigureOut">
               <a:rPr lang="en-US" smtClean="0"/>
-              <a:t>12/1/2017</a:t>
+              <a:t>12/3/2017</a:t>
             </a:fld>
             <a:endParaRPr lang="en-US"/>
           </a:p>
@@ -8980,7 +8983,7 @@
               <a:buNone/>
             </a:pPr>
             <a:r>
-              <a:rPr lang="fr-FR" dirty="0" err="1">
+              <a:rPr lang="fr-FR" dirty="0" smtClean="0">
                 <a:effectLst>
                   <a:outerShdw blurRad="38100" dist="38100" dir="2700000" algn="tl">
                     <a:srgbClr val="000000">
@@ -8989,7 +8992,7 @@
                   </a:outerShdw>
                 </a:effectLst>
               </a:rPr>
-              <a:t>Interprêter</a:t>
+              <a:t>Interpréter </a:t>
             </a:r>
             <a:r>
               <a:rPr lang="fr-FR" dirty="0">
@@ -9001,7 +9004,7 @@
                   </a:outerShdw>
                 </a:effectLst>
               </a:rPr>
-              <a:t> un rapport </a:t>
+              <a:t>un rapport </a:t>
             </a:r>
             <a:r>
               <a:rPr lang="fr-FR" dirty="0" err="1">
@@ -9272,11 +9275,15 @@
             </a:r>
             <a:r>
               <a:rPr lang="en-US" dirty="0" err="1" smtClean="0"/>
-              <a:t>Interprêter</a:t>
-            </a:r>
-            <a:r>
-              <a:rPr lang="en-US" dirty="0" smtClean="0"/>
-              <a:t> un rapport </a:t>
+              <a:t>Interpréter</a:t>
+            </a:r>
+            <a:r>
+              <a:rPr lang="en-US" dirty="0" smtClean="0"/>
+              <a:t> </a:t>
+            </a:r>
+            <a:r>
+              <a:rPr lang="en-US" dirty="0" smtClean="0"/>
+              <a:t>un rapport </a:t>
             </a:r>
             <a:r>
               <a:rPr lang="en-US" dirty="0" err="1" smtClean="0"/>
@@ -9290,6 +9297,404 @@
     <p:extLst>
       <p:ext uri="{BB962C8B-B14F-4D97-AF65-F5344CB8AC3E}">
         <p14:creationId xmlns:p14="http://schemas.microsoft.com/office/powerpoint/2010/main" val="2305966738"/>
+      </p:ext>
+    </p:extLst>
+  </p:cSld>
+  <p:clrMapOvr>
+    <a:masterClrMapping/>
+  </p:clrMapOvr>
+</p:sld>
+</file>
+
+<file path=ppt/slides/slide18.xml><?xml version="1.0" encoding="utf-8"?>
+<p:sld xmlns:a="http://schemas.openxmlformats.org/drawingml/2006/main" xmlns:r="http://schemas.openxmlformats.org/officeDocument/2006/relationships" xmlns:p="http://schemas.openxmlformats.org/presentationml/2006/main">
+  <p:cSld>
+    <p:spTree>
+      <p:nvGrpSpPr>
+        <p:cNvPr id="1" name=""/>
+        <p:cNvGrpSpPr/>
+        <p:nvPr/>
+      </p:nvGrpSpPr>
+      <p:grpSpPr>
+        <a:xfrm>
+          <a:off x="0" y="0"/>
+          <a:ext cx="0" cy="0"/>
+          <a:chOff x="0" y="0"/>
+          <a:chExt cx="0" cy="0"/>
+        </a:xfrm>
+      </p:grpSpPr>
+      <p:sp>
+        <p:nvSpPr>
+          <p:cNvPr id="2" name="Title 1"/>
+          <p:cNvSpPr>
+            <a:spLocks noGrp="1"/>
+          </p:cNvSpPr>
+          <p:nvPr>
+            <p:ph type="title"/>
+          </p:nvPr>
+        </p:nvSpPr>
+        <p:spPr>
+          <a:xfrm>
+            <a:off x="1905000" y="381000"/>
+            <a:ext cx="6512511" cy="1143000"/>
+          </a:xfrm>
+        </p:spPr>
+        <p:txBody>
+          <a:bodyPr/>
+          <a:lstStyle/>
+          <a:p>
+            <a:pPr marL="0" indent="0" algn="ctr">
+              <a:buNone/>
+            </a:pPr>
+            <a:r>
+              <a:rPr lang="en-US" dirty="0" smtClean="0"/>
+              <a:t>Demo : </a:t>
+            </a:r>
+            <a:r>
+              <a:rPr lang="en-US" dirty="0" err="1" smtClean="0"/>
+              <a:t>Utiliser</a:t>
+            </a:r>
+            <a:r>
+              <a:rPr lang="en-US" dirty="0" smtClean="0"/>
+              <a:t> </a:t>
+            </a:r>
+            <a:r>
+              <a:rPr lang="fr-FR" dirty="0" err="1"/>
+              <a:t>PSCodeHealth</a:t>
+            </a:r>
+            <a:r>
+              <a:rPr lang="fr-FR" dirty="0"/>
+              <a:t> pour </a:t>
+            </a:r>
+            <a:r>
+              <a:rPr lang="fr-FR" dirty="0" smtClean="0"/>
+              <a:t>vérifier </a:t>
+            </a:r>
+            <a:r>
+              <a:rPr lang="fr-FR" dirty="0"/>
+              <a:t>les </a:t>
+            </a:r>
+            <a:r>
+              <a:rPr lang="fr-FR" dirty="0" smtClean="0"/>
+              <a:t>progrès</a:t>
+            </a:r>
+            <a:endParaRPr lang="en-US" dirty="0"/>
+          </a:p>
+        </p:txBody>
+      </p:sp>
+    </p:spTree>
+    <p:extLst>
+      <p:ext uri="{BB962C8B-B14F-4D97-AF65-F5344CB8AC3E}">
+        <p14:creationId xmlns:p14="http://schemas.microsoft.com/office/powerpoint/2010/main" val="2120352553"/>
+      </p:ext>
+    </p:extLst>
+  </p:cSld>
+  <p:clrMapOvr>
+    <a:masterClrMapping/>
+  </p:clrMapOvr>
+</p:sld>
+</file>
+
+<file path=ppt/slides/slide19.xml><?xml version="1.0" encoding="utf-8"?>
+<p:sld xmlns:a="http://schemas.openxmlformats.org/drawingml/2006/main" xmlns:r="http://schemas.openxmlformats.org/officeDocument/2006/relationships" xmlns:p="http://schemas.openxmlformats.org/presentationml/2006/main">
+  <p:cSld>
+    <p:spTree>
+      <p:nvGrpSpPr>
+        <p:cNvPr id="1" name=""/>
+        <p:cNvGrpSpPr/>
+        <p:nvPr/>
+      </p:nvGrpSpPr>
+      <p:grpSpPr>
+        <a:xfrm>
+          <a:off x="0" y="0"/>
+          <a:ext cx="0" cy="0"/>
+          <a:chOff x="0" y="0"/>
+          <a:chExt cx="0" cy="0"/>
+        </a:xfrm>
+      </p:grpSpPr>
+      <p:sp>
+        <p:nvSpPr>
+          <p:cNvPr id="2" name="Title 1"/>
+          <p:cNvSpPr>
+            <a:spLocks noGrp="1"/>
+          </p:cNvSpPr>
+          <p:nvPr>
+            <p:ph type="title"/>
+          </p:nvPr>
+        </p:nvSpPr>
+        <p:spPr>
+          <a:xfrm>
+            <a:off x="1524000" y="304800"/>
+            <a:ext cx="6512511" cy="1143000"/>
+          </a:xfrm>
+        </p:spPr>
+        <p:txBody>
+          <a:bodyPr/>
+          <a:lstStyle/>
+          <a:p>
+            <a:pPr marL="0" indent="0">
+              <a:buNone/>
+            </a:pPr>
+            <a:r>
+              <a:rPr lang="en-US" dirty="0" err="1" smtClean="0"/>
+              <a:t>Personnaliser</a:t>
+            </a:r>
+            <a:r>
+              <a:rPr lang="en-US" dirty="0" smtClean="0"/>
+              <a:t> les </a:t>
+            </a:r>
+            <a:r>
+              <a:rPr lang="en-US" dirty="0" err="1" smtClean="0"/>
+              <a:t>règles</a:t>
+            </a:r>
+            <a:r>
+              <a:rPr lang="en-US" dirty="0" smtClean="0"/>
+              <a:t> de </a:t>
+            </a:r>
+            <a:r>
+              <a:rPr lang="en-US" dirty="0" err="1" smtClean="0"/>
+              <a:t>métriques</a:t>
+            </a:r>
+            <a:endParaRPr lang="en-US" dirty="0"/>
+          </a:p>
+        </p:txBody>
+      </p:sp>
+      <p:sp>
+        <p:nvSpPr>
+          <p:cNvPr id="3" name="Content Placeholder 2"/>
+          <p:cNvSpPr>
+            <a:spLocks noGrp="1"/>
+          </p:cNvSpPr>
+          <p:nvPr>
+            <p:ph sz="quarter" idx="13"/>
+          </p:nvPr>
+        </p:nvSpPr>
+        <p:spPr>
+          <a:xfrm>
+            <a:off x="1295400" y="2590800"/>
+            <a:ext cx="6400800" cy="3474720"/>
+          </a:xfrm>
+        </p:spPr>
+        <p:txBody>
+          <a:bodyPr>
+            <a:normAutofit lnSpcReduction="10000"/>
+          </a:bodyPr>
+          <a:lstStyle/>
+          <a:p>
+            <a:pPr>
+              <a:buFont typeface="Courier New" panose="02070309020205020404" pitchFamily="49" charset="0"/>
+              <a:buChar char="o"/>
+            </a:pPr>
+            <a:r>
+              <a:rPr lang="en-US" dirty="0" smtClean="0"/>
+              <a:t> Les </a:t>
+            </a:r>
+            <a:r>
+              <a:rPr lang="en-US" dirty="0" err="1" smtClean="0"/>
+              <a:t>règles</a:t>
+            </a:r>
+            <a:r>
+              <a:rPr lang="en-US" dirty="0" smtClean="0"/>
+              <a:t> de </a:t>
+            </a:r>
+            <a:r>
+              <a:rPr lang="en-US" dirty="0" err="1" smtClean="0"/>
+              <a:t>métriques</a:t>
+            </a:r>
+            <a:r>
+              <a:rPr lang="en-US" dirty="0" smtClean="0"/>
+              <a:t> par </a:t>
+            </a:r>
+            <a:r>
+              <a:rPr lang="en-US" dirty="0" err="1" smtClean="0"/>
+              <a:t>défaut</a:t>
+            </a:r>
+            <a:endParaRPr lang="en-US" dirty="0" smtClean="0"/>
+          </a:p>
+          <a:p>
+            <a:pPr lvl="1">
+              <a:buFont typeface="Wingdings" panose="05000000000000000000" pitchFamily="2" charset="2"/>
+              <a:buChar char="Ø"/>
+            </a:pPr>
+            <a:r>
+              <a:rPr lang="en-US" dirty="0"/>
+              <a:t> </a:t>
+            </a:r>
+            <a:r>
+              <a:rPr lang="en-US" dirty="0" smtClean="0"/>
+              <a:t>Get-</a:t>
+            </a:r>
+            <a:r>
+              <a:rPr lang="en-US" dirty="0" err="1" smtClean="0"/>
+              <a:t>PSCodeHealthComplianceRule</a:t>
+            </a:r>
+            <a:endParaRPr lang="en-US" dirty="0" smtClean="0"/>
+          </a:p>
+          <a:p>
+            <a:pPr>
+              <a:buFont typeface="Courier New" panose="02070309020205020404" pitchFamily="49" charset="0"/>
+              <a:buChar char="o"/>
+            </a:pPr>
+            <a:endParaRPr lang="en-US" dirty="0"/>
+          </a:p>
+          <a:p>
+            <a:pPr>
+              <a:buFont typeface="Courier New" panose="02070309020205020404" pitchFamily="49" charset="0"/>
+              <a:buChar char="o"/>
+            </a:pPr>
+            <a:r>
+              <a:rPr lang="en-US" dirty="0" smtClean="0"/>
+              <a:t> </a:t>
+            </a:r>
+            <a:r>
+              <a:rPr lang="en-US" dirty="0" err="1" smtClean="0"/>
+              <a:t>Vérifier</a:t>
+            </a:r>
+            <a:r>
+              <a:rPr lang="en-US" dirty="0" smtClean="0"/>
+              <a:t> </a:t>
+            </a:r>
+            <a:r>
+              <a:rPr lang="en-US" dirty="0" err="1" smtClean="0"/>
+              <a:t>qu’un</a:t>
+            </a:r>
+            <a:r>
+              <a:rPr lang="en-US" dirty="0" smtClean="0"/>
+              <a:t> </a:t>
+            </a:r>
+            <a:r>
+              <a:rPr lang="en-US" dirty="0" err="1" smtClean="0"/>
+              <a:t>projet</a:t>
+            </a:r>
+            <a:r>
+              <a:rPr lang="en-US" dirty="0" smtClean="0"/>
+              <a:t> PowerShell </a:t>
+            </a:r>
+            <a:r>
+              <a:rPr lang="en-US" dirty="0" err="1" smtClean="0"/>
+              <a:t>est</a:t>
+            </a:r>
+            <a:r>
+              <a:rPr lang="en-US" dirty="0" smtClean="0"/>
+              <a:t> </a:t>
+            </a:r>
+            <a:r>
+              <a:rPr lang="en-US" dirty="0" err="1" smtClean="0"/>
+              <a:t>en</a:t>
+            </a:r>
+            <a:r>
+              <a:rPr lang="en-US" dirty="0" smtClean="0"/>
+              <a:t> </a:t>
+            </a:r>
+            <a:r>
+              <a:rPr lang="en-US" dirty="0" err="1" smtClean="0"/>
+              <a:t>conformité</a:t>
+            </a:r>
+            <a:r>
+              <a:rPr lang="en-US" dirty="0" smtClean="0"/>
+              <a:t> avec les </a:t>
+            </a:r>
+            <a:r>
+              <a:rPr lang="en-US" dirty="0" err="1" smtClean="0"/>
+              <a:t>règles</a:t>
+            </a:r>
+            <a:endParaRPr lang="en-US" dirty="0" smtClean="0"/>
+          </a:p>
+          <a:p>
+            <a:pPr lvl="1">
+              <a:buFont typeface="Wingdings" panose="05000000000000000000" pitchFamily="2" charset="2"/>
+              <a:buChar char="Ø"/>
+            </a:pPr>
+            <a:r>
+              <a:rPr lang="en-US" dirty="0"/>
+              <a:t> </a:t>
+            </a:r>
+            <a:r>
+              <a:rPr lang="en-US" dirty="0" smtClean="0"/>
+              <a:t>Test-</a:t>
+            </a:r>
+            <a:r>
+              <a:rPr lang="en-US" dirty="0" err="1" smtClean="0"/>
+              <a:t>PSCodeHealthCompliance</a:t>
+            </a:r>
+            <a:endParaRPr lang="en-US" dirty="0" smtClean="0"/>
+          </a:p>
+          <a:p>
+            <a:pPr>
+              <a:buFont typeface="Courier New" panose="02070309020205020404" pitchFamily="49" charset="0"/>
+              <a:buChar char="o"/>
+            </a:pPr>
+            <a:endParaRPr lang="en-US" dirty="0"/>
+          </a:p>
+          <a:p>
+            <a:pPr>
+              <a:buFont typeface="Courier New" panose="02070309020205020404" pitchFamily="49" charset="0"/>
+              <a:buChar char="o"/>
+            </a:pPr>
+            <a:r>
+              <a:rPr lang="en-US" dirty="0" smtClean="0"/>
+              <a:t> </a:t>
+            </a:r>
+            <a:r>
+              <a:rPr lang="en-US" dirty="0" err="1" smtClean="0"/>
+              <a:t>Personnaliser</a:t>
+            </a:r>
+            <a:r>
+              <a:rPr lang="en-US" dirty="0" smtClean="0"/>
+              <a:t> les </a:t>
+            </a:r>
+            <a:r>
+              <a:rPr lang="en-US" dirty="0" err="1" smtClean="0"/>
+              <a:t>règles</a:t>
+            </a:r>
+            <a:r>
+              <a:rPr lang="en-US" dirty="0" smtClean="0"/>
+              <a:t> de </a:t>
+            </a:r>
+            <a:r>
+              <a:rPr lang="en-US" dirty="0" err="1" smtClean="0"/>
+              <a:t>metriques</a:t>
+            </a:r>
+            <a:r>
+              <a:rPr lang="en-US" dirty="0" smtClean="0"/>
+              <a:t> pour </a:t>
+            </a:r>
+            <a:r>
+              <a:rPr lang="en-US" dirty="0" err="1" smtClean="0"/>
+              <a:t>coller</a:t>
+            </a:r>
+            <a:r>
+              <a:rPr lang="en-US" dirty="0" smtClean="0"/>
+              <a:t> aux </a:t>
+            </a:r>
+            <a:r>
+              <a:rPr lang="en-US" dirty="0" err="1" smtClean="0"/>
+              <a:t>besoins</a:t>
+            </a:r>
+            <a:r>
+              <a:rPr lang="en-US" dirty="0" smtClean="0"/>
+              <a:t> de </a:t>
+            </a:r>
+            <a:r>
+              <a:rPr lang="en-US" dirty="0" err="1" smtClean="0"/>
+              <a:t>notre</a:t>
+            </a:r>
+            <a:r>
+              <a:rPr lang="en-US" dirty="0" smtClean="0"/>
+              <a:t> </a:t>
+            </a:r>
+            <a:r>
+              <a:rPr lang="en-US" dirty="0" err="1" smtClean="0"/>
+              <a:t>projet</a:t>
+            </a:r>
+            <a:endParaRPr lang="en-US" dirty="0"/>
+          </a:p>
+        </p:txBody>
+      </p:sp>
+    </p:spTree>
+    <p:extLst>
+      <p:ext uri="{BB962C8B-B14F-4D97-AF65-F5344CB8AC3E}">
+        <p14:creationId xmlns:p14="http://schemas.microsoft.com/office/powerpoint/2010/main" val="4205717637"/>
       </p:ext>
     </p:extLst>
   </p:cSld>
@@ -9525,7 +9930,7 @@
               <a:t> </a:t>
             </a:r>
             <a:r>
-              <a:rPr lang="fr-FR" dirty="0" err="1">
+              <a:rPr lang="fr-FR" dirty="0" smtClean="0">
                 <a:effectLst>
                   <a:outerShdw blurRad="38100" dist="38100" dir="2700000" algn="tl">
                     <a:srgbClr val="000000">
@@ -9534,19 +9939,7 @@
                   </a:outerShdw>
                 </a:effectLst>
               </a:rPr>
-              <a:t>Interprêter</a:t>
-            </a:r>
-            <a:r>
-              <a:rPr lang="fr-FR" dirty="0">
-                <a:effectLst>
-                  <a:outerShdw blurRad="38100" dist="38100" dir="2700000" algn="tl">
-                    <a:srgbClr val="000000">
-                      <a:alpha val="43137"/>
-                    </a:srgbClr>
-                  </a:outerShdw>
-                </a:effectLst>
-              </a:rPr>
-              <a:t> </a:t>
+              <a:t>Interpréter </a:t>
             </a:r>
             <a:r>
               <a:rPr lang="fr-FR" dirty="0" smtClean="0">
@@ -9603,18 +9996,6 @@
               <a:t> </a:t>
             </a:r>
             <a:r>
-              <a:rPr lang="fr-FR" dirty="0" err="1" smtClean="0">
-                <a:effectLst>
-                  <a:outerShdw blurRad="38100" dist="38100" dir="2700000" algn="tl">
-                    <a:srgbClr val="000000">
-                      <a:alpha val="43137"/>
-                    </a:srgbClr>
-                  </a:outerShdw>
-                </a:effectLst>
-              </a:rPr>
-              <a:t>Personaliser</a:t>
-            </a:r>
-            <a:r>
               <a:rPr lang="fr-FR" dirty="0" smtClean="0">
                 <a:effectLst>
                   <a:outerShdw blurRad="38100" dist="38100" dir="2700000" algn="tl">
@@ -9624,7 +10005,19 @@
                   </a:outerShdw>
                 </a:effectLst>
               </a:rPr>
-              <a:t> les règles de métriques </a:t>
+              <a:t>Personnaliser </a:t>
+            </a:r>
+            <a:r>
+              <a:rPr lang="fr-FR" dirty="0" smtClean="0">
+                <a:effectLst>
+                  <a:outerShdw blurRad="38100" dist="38100" dir="2700000" algn="tl">
+                    <a:srgbClr val="000000">
+                      <a:alpha val="43137"/>
+                    </a:srgbClr>
+                  </a:outerShdw>
+                </a:effectLst>
+              </a:rPr>
+              <a:t>les règles de métriques </a:t>
             </a:r>
             <a:r>
               <a:rPr lang="fr-FR" dirty="0" err="1" smtClean="0">
@@ -9667,6 +10060,95 @@
       </p:par>
     </p:tnLst>
   </p:timing>
+</p:sld>
+</file>
+
+<file path=ppt/slides/slide20.xml><?xml version="1.0" encoding="utf-8"?>
+<p:sld xmlns:a="http://schemas.openxmlformats.org/drawingml/2006/main" xmlns:r="http://schemas.openxmlformats.org/officeDocument/2006/relationships" xmlns:p="http://schemas.openxmlformats.org/presentationml/2006/main">
+  <p:cSld>
+    <p:spTree>
+      <p:nvGrpSpPr>
+        <p:cNvPr id="1" name=""/>
+        <p:cNvGrpSpPr/>
+        <p:nvPr/>
+      </p:nvGrpSpPr>
+      <p:grpSpPr>
+        <a:xfrm>
+          <a:off x="0" y="0"/>
+          <a:ext cx="0" cy="0"/>
+          <a:chOff x="0" y="0"/>
+          <a:chExt cx="0" cy="0"/>
+        </a:xfrm>
+      </p:grpSpPr>
+      <p:sp>
+        <p:nvSpPr>
+          <p:cNvPr id="2" name="Title 1"/>
+          <p:cNvSpPr>
+            <a:spLocks noGrp="1"/>
+          </p:cNvSpPr>
+          <p:nvPr>
+            <p:ph type="title"/>
+          </p:nvPr>
+        </p:nvSpPr>
+        <p:spPr>
+          <a:xfrm>
+            <a:off x="1752600" y="381000"/>
+            <a:ext cx="6512511" cy="1143000"/>
+          </a:xfrm>
+        </p:spPr>
+        <p:txBody>
+          <a:bodyPr/>
+          <a:lstStyle/>
+          <a:p>
+            <a:pPr marL="0" indent="0" algn="ctr">
+              <a:buNone/>
+            </a:pPr>
+            <a:r>
+              <a:rPr lang="en-US" dirty="0" smtClean="0"/>
+              <a:t>Demo : </a:t>
+            </a:r>
+            <a:r>
+              <a:rPr lang="en-US" dirty="0" err="1" smtClean="0"/>
+              <a:t>Personnaliser</a:t>
+            </a:r>
+            <a:r>
+              <a:rPr lang="en-US" dirty="0" smtClean="0"/>
+              <a:t> les </a:t>
+            </a:r>
+            <a:r>
+              <a:rPr lang="en-US" dirty="0" err="1" smtClean="0"/>
+              <a:t>règles</a:t>
+            </a:r>
+            <a:r>
+              <a:rPr lang="en-US" dirty="0" smtClean="0"/>
+              <a:t> de </a:t>
+            </a:r>
+            <a:r>
+              <a:rPr lang="en-US" dirty="0" err="1" smtClean="0"/>
+              <a:t>métriques</a:t>
+            </a:r>
+            <a:r>
+              <a:rPr lang="en-US" dirty="0" smtClean="0"/>
+              <a:t> </a:t>
+            </a:r>
+            <a:r>
+              <a:rPr lang="en-US" dirty="0" err="1" smtClean="0"/>
+              <a:t>PSCodeHealth</a:t>
+            </a:r>
+            <a:endParaRPr lang="en-US" dirty="0"/>
+          </a:p>
+        </p:txBody>
+      </p:sp>
+    </p:spTree>
+    <p:extLst>
+      <p:ext uri="{BB962C8B-B14F-4D97-AF65-F5344CB8AC3E}">
+        <p14:creationId xmlns:p14="http://schemas.microsoft.com/office/powerpoint/2010/main" val="737920564"/>
+      </p:ext>
+    </p:extLst>
+  </p:cSld>
+  <p:clrMapOvr>
+    <a:masterClrMapping/>
+  </p:clrMapOvr>
 </p:sld>
 </file>
 

</xml_diff>